<commit_message>
contribution Robin parts to final presenation and date update
</commit_message>
<xml_diff>
--- a/presentation/final_presentation.pptx
+++ b/presentation/final_presentation.pptx
@@ -228,7 +228,7 @@
           <a:p>
             <a:fld id="{9E86C065-9ECC-42E5-868F-B6CD22341737}" type="datetimeFigureOut">
               <a:rPr lang="nl-BE" smtClean="0"/>
-              <a:t>7/05/2020</a:t>
+              <a:t>10/05/2020</a:t>
             </a:fld>
             <a:endParaRPr lang="nl-BE"/>
           </a:p>
@@ -779,6 +779,90 @@
           <a:bodyPr/>
           <a:lstStyle/>
           <a:p>
+            <a:endParaRPr lang="nl-BE" dirty="0"/>
+          </a:p>
+        </p:txBody>
+      </p:sp>
+      <p:sp>
+        <p:nvSpPr>
+          <p:cNvPr id="4" name="Tijdelijke aanduiding voor dianummer 3"/>
+          <p:cNvSpPr>
+            <a:spLocks noGrp="1"/>
+          </p:cNvSpPr>
+          <p:nvPr>
+            <p:ph type="sldNum" sz="quarter" idx="5"/>
+          </p:nvPr>
+        </p:nvSpPr>
+        <p:spPr/>
+        <p:txBody>
+          <a:bodyPr/>
+          <a:lstStyle/>
+          <a:p>
+            <a:fld id="{E9444F9F-0AE5-465A-916E-50425009CEBB}" type="slidenum">
+              <a:rPr lang="nl-BE" smtClean="0"/>
+              <a:t>10</a:t>
+            </a:fld>
+            <a:endParaRPr lang="nl-BE"/>
+          </a:p>
+        </p:txBody>
+      </p:sp>
+    </p:spTree>
+    <p:extLst>
+      <p:ext uri="{BB962C8B-B14F-4D97-AF65-F5344CB8AC3E}">
+        <p14:creationId xmlns:p14="http://schemas.microsoft.com/office/powerpoint/2010/main" val="3998883624"/>
+      </p:ext>
+    </p:extLst>
+  </p:cSld>
+  <p:clrMapOvr>
+    <a:masterClrMapping/>
+  </p:clrMapOvr>
+</p:notes>
+</file>
+
+<file path=ppt/notesSlides/notesSlide4.xml><?xml version="1.0" encoding="utf-8"?>
+<p:notes xmlns:a="http://schemas.openxmlformats.org/drawingml/2006/main" xmlns:r="http://schemas.openxmlformats.org/officeDocument/2006/relationships" xmlns:p="http://schemas.openxmlformats.org/presentationml/2006/main">
+  <p:cSld>
+    <p:spTree>
+      <p:nvGrpSpPr>
+        <p:cNvPr id="1" name=""/>
+        <p:cNvGrpSpPr/>
+        <p:nvPr/>
+      </p:nvGrpSpPr>
+      <p:grpSpPr>
+        <a:xfrm>
+          <a:off x="0" y="0"/>
+          <a:ext cx="0" cy="0"/>
+          <a:chOff x="0" y="0"/>
+          <a:chExt cx="0" cy="0"/>
+        </a:xfrm>
+      </p:grpSpPr>
+      <p:sp>
+        <p:nvSpPr>
+          <p:cNvPr id="2" name="Tijdelijke aanduiding voor dia-afbeelding 1"/>
+          <p:cNvSpPr>
+            <a:spLocks noGrp="1" noRot="1" noChangeAspect="1"/>
+          </p:cNvSpPr>
+          <p:nvPr>
+            <p:ph type="sldImg"/>
+          </p:nvPr>
+        </p:nvSpPr>
+        <p:spPr/>
+      </p:sp>
+      <p:sp>
+        <p:nvSpPr>
+          <p:cNvPr id="3" name="Tijdelijke aanduiding voor notities 2"/>
+          <p:cNvSpPr>
+            <a:spLocks noGrp="1"/>
+          </p:cNvSpPr>
+          <p:nvPr>
+            <p:ph type="body" idx="1"/>
+          </p:nvPr>
+        </p:nvSpPr>
+        <p:spPr/>
+        <p:txBody>
+          <a:bodyPr/>
+          <a:lstStyle/>
+          <a:p>
             <a:r>
               <a:rPr lang="de-LI" dirty="0"/>
               <a:t>The </a:t>
@@ -1737,7 +1821,7 @@
 </p:notes>
 </file>
 
-<file path=ppt/notesSlides/notesSlide4.xml><?xml version="1.0" encoding="utf-8"?>
+<file path=ppt/notesSlides/notesSlide5.xml><?xml version="1.0" encoding="utf-8"?>
 <p:notes xmlns:a="http://schemas.openxmlformats.org/drawingml/2006/main" xmlns:r="http://schemas.openxmlformats.org/officeDocument/2006/relationships" xmlns:p="http://schemas.openxmlformats.org/presentationml/2006/main">
   <p:cSld>
     <p:spTree>
@@ -2374,7 +2458,7 @@
           <a:p>
             <a:fld id="{0635C875-30D1-4A16-B5FC-39A3B940C621}" type="datetimeFigureOut">
               <a:rPr lang="nl-BE" smtClean="0"/>
-              <a:t>7/05/2020</a:t>
+              <a:t>10/05/2020</a:t>
             </a:fld>
             <a:endParaRPr lang="nl-BE"/>
           </a:p>
@@ -2816,7 +2900,7 @@
           <a:p>
             <a:fld id="{EA3A7081-D270-4FBF-AE40-A52D674243CC}" type="datetime1">
               <a:rPr lang="nl-BE" smtClean="0"/>
-              <a:t>7/05/2020</a:t>
+              <a:t>10/05/2020</a:t>
             </a:fld>
             <a:endParaRPr lang="nl-NL"/>
           </a:p>
@@ -3099,7 +3183,7 @@
           <a:p>
             <a:fld id="{5C69415A-EEF6-439C-A913-189A8C067023}" type="datetime1">
               <a:rPr lang="nl-BE" smtClean="0"/>
-              <a:t>7/05/2020</a:t>
+              <a:t>10/05/2020</a:t>
             </a:fld>
             <a:endParaRPr lang="nl-NL"/>
           </a:p>
@@ -3429,7 +3513,7 @@
           <a:p>
             <a:fld id="{0635C875-30D1-4A16-B5FC-39A3B940C621}" type="datetimeFigureOut">
               <a:rPr lang="nl-BE" smtClean="0"/>
-              <a:t>7/05/2020</a:t>
+              <a:t>10/05/2020</a:t>
             </a:fld>
             <a:endParaRPr lang="nl-BE"/>
           </a:p>
@@ -3790,7 +3874,7 @@
           <a:p>
             <a:fld id="{0635C875-30D1-4A16-B5FC-39A3B940C621}" type="datetimeFigureOut">
               <a:rPr lang="nl-BE" smtClean="0"/>
-              <a:t>7/05/2020</a:t>
+              <a:t>10/05/2020</a:t>
             </a:fld>
             <a:endParaRPr lang="nl-BE"/>
           </a:p>
@@ -3959,7 +4043,7 @@
           <a:p>
             <a:fld id="{0635C875-30D1-4A16-B5FC-39A3B940C621}" type="datetimeFigureOut">
               <a:rPr lang="nl-BE" smtClean="0"/>
-              <a:t>7/05/2020</a:t>
+              <a:t>10/05/2020</a:t>
             </a:fld>
             <a:endParaRPr lang="nl-BE"/>
           </a:p>
@@ -4275,7 +4359,7 @@
           <a:p>
             <a:fld id="{0635C875-30D1-4A16-B5FC-39A3B940C621}" type="datetimeFigureOut">
               <a:rPr lang="nl-BE" smtClean="0"/>
-              <a:t>7/05/2020</a:t>
+              <a:t>10/05/2020</a:t>
             </a:fld>
             <a:endParaRPr lang="nl-BE"/>
           </a:p>
@@ -4591,7 +4675,7 @@
           <a:p>
             <a:fld id="{0635C875-30D1-4A16-B5FC-39A3B940C621}" type="datetimeFigureOut">
               <a:rPr lang="nl-BE" smtClean="0"/>
-              <a:t>7/05/2020</a:t>
+              <a:t>10/05/2020</a:t>
             </a:fld>
             <a:endParaRPr lang="nl-BE"/>
           </a:p>
@@ -4734,7 +4818,7 @@
           <a:p>
             <a:fld id="{0635C875-30D1-4A16-B5FC-39A3B940C621}" type="datetimeFigureOut">
               <a:rPr lang="nl-BE" smtClean="0"/>
-              <a:t>7/05/2020</a:t>
+              <a:t>10/05/2020</a:t>
             </a:fld>
             <a:endParaRPr lang="nl-BE"/>
           </a:p>
@@ -5214,7 +5298,7 @@
           <a:p>
             <a:fld id="{0635C875-30D1-4A16-B5FC-39A3B940C621}" type="datetimeFigureOut">
               <a:rPr lang="nl-BE" smtClean="0"/>
-              <a:t>7/05/2020</a:t>
+              <a:t>10/05/2020</a:t>
             </a:fld>
             <a:endParaRPr lang="nl-BE"/>
           </a:p>
@@ -5332,7 +5416,7 @@
           <a:p>
             <a:fld id="{0635C875-30D1-4A16-B5FC-39A3B940C621}" type="datetimeFigureOut">
               <a:rPr lang="nl-BE" smtClean="0"/>
-              <a:t>7/05/2020</a:t>
+              <a:t>10/05/2020</a:t>
             </a:fld>
             <a:endParaRPr lang="nl-BE"/>
           </a:p>
@@ -5449,7 +5533,7 @@
           <a:p>
             <a:fld id="{0635C875-30D1-4A16-B5FC-39A3B940C621}" type="datetimeFigureOut">
               <a:rPr lang="nl-BE" smtClean="0"/>
-              <a:t>7/05/2020</a:t>
+              <a:t>10/05/2020</a:t>
             </a:fld>
             <a:endParaRPr lang="nl-BE"/>
           </a:p>
@@ -5628,7 +5712,7 @@
           <a:p>
             <a:fld id="{0635C875-30D1-4A16-B5FC-39A3B940C621}" type="datetimeFigureOut">
               <a:rPr lang="nl-BE" smtClean="0"/>
-              <a:t>7/05/2020</a:t>
+              <a:t>10/05/2020</a:t>
             </a:fld>
             <a:endParaRPr lang="nl-BE"/>
           </a:p>
@@ -5914,7 +5998,7 @@
           <a:p>
             <a:fld id="{0635C875-30D1-4A16-B5FC-39A3B940C621}" type="datetimeFigureOut">
               <a:rPr lang="nl-BE" smtClean="0"/>
-              <a:t>7/05/2020</a:t>
+              <a:t>10/05/2020</a:t>
             </a:fld>
             <a:endParaRPr lang="nl-BE"/>
           </a:p>
@@ -6550,7 +6634,7 @@
           <a:p>
             <a:fld id="{48C250A7-EEA6-4BD5-AB95-D7BF57F3506B}" type="datetime1">
               <a:rPr lang="nl-BE" smtClean="0"/>
-              <a:t>7/05/2020</a:t>
+              <a:t>10/05/2020</a:t>
             </a:fld>
             <a:endParaRPr lang="nl-NL" dirty="0"/>
           </a:p>
@@ -7007,7 +7091,7 @@
           <a:p>
             <a:r>
               <a:rPr lang="nl-NL" dirty="0"/>
-              <a:t>16-4-2020</a:t>
+              <a:t>13-5-2020</a:t>
             </a:r>
             <a:endParaRPr lang="nl-BE" dirty="0"/>
           </a:p>
@@ -7145,6 +7229,15 @@
               <a:t>A tutorial on 3D-printing design with fusion360</a:t>
             </a:r>
           </a:p>
+          <a:p>
+            <a:r>
+              <a:rPr lang="en-GB" dirty="0"/>
+              <a:t>Design of housing</a:t>
+            </a:r>
+          </a:p>
+          <a:p>
+            <a:endParaRPr lang="en-GB" dirty="0"/>
+          </a:p>
         </p:txBody>
       </p:sp>
       <p:sp>
@@ -7203,7 +7296,7 @@
           <a:p>
             <a:r>
               <a:rPr lang="en-GB" dirty="0"/>
-              <a:t>Design of the housing taken all the individual elements into account</a:t>
+              <a:t>Checking hardware fits in housing</a:t>
             </a:r>
           </a:p>
         </p:txBody>
@@ -7344,38 +7437,21 @@
           <a:p>
             <a:r>
               <a:rPr lang="en-GB" dirty="0"/>
-              <a:t>Available 3D-printer</a:t>
+              <a:t>Delay on delivery housing </a:t>
             </a:r>
           </a:p>
           <a:p>
             <a:pPr lvl="1"/>
             <a:r>
               <a:rPr lang="en-GB" dirty="0"/>
-              <a:t>Do not own one</a:t>
+              <a:t>Due to corona measurements</a:t>
             </a:r>
           </a:p>
           <a:p>
             <a:pPr lvl="1"/>
             <a:r>
               <a:rPr lang="en-GB" dirty="0"/>
-              <a:t>3D-printer at work, could be a possibility</a:t>
-            </a:r>
-            <a:br>
-              <a:rPr lang="en-GB" dirty="0"/>
-            </a:br>
-            <a:r>
-              <a:rPr lang="en-GB" dirty="0"/>
-              <a:t>Need to check with work</a:t>
-            </a:r>
-          </a:p>
-          <a:p>
-            <a:pPr lvl="1"/>
-            <a:endParaRPr lang="en-GB" dirty="0"/>
-          </a:p>
-          <a:p>
-            <a:r>
-              <a:rPr lang="en-GB" dirty="0"/>
-              <a:t>Checking the fitting of the design in the housing</a:t>
+              <a:t>Fitting design housing not possible</a:t>
             </a:r>
             <a:endParaRPr lang="nl-BE" dirty="0"/>
           </a:p>
@@ -7418,6 +7494,42 @@
           </a:p>
         </p:txBody>
       </p:sp>
+      <p:pic>
+        <p:nvPicPr>
+          <p:cNvPr id="4" name="Afbeelding 3" descr="Afbeelding met computer, tafel&#10;&#10;Automatisch gegenereerde beschrijving">
+            <a:extLst>
+              <a:ext uri="{FF2B5EF4-FFF2-40B4-BE49-F238E27FC236}">
+                <a16:creationId xmlns:a16="http://schemas.microsoft.com/office/drawing/2014/main" id="{4D8835E0-1BF6-44A5-A34A-3CFE71105B74}"/>
+              </a:ext>
+            </a:extLst>
+          </p:cNvPr>
+          <p:cNvPicPr>
+            <a:picLocks noChangeAspect="1"/>
+          </p:cNvPicPr>
+          <p:nvPr/>
+        </p:nvPicPr>
+        <p:blipFill>
+          <a:blip r:embed="rId2">
+            <a:extLst>
+              <a:ext uri="{28A0092B-C50C-407E-A947-70E740481C1C}">
+                <a14:useLocalDpi xmlns:a14="http://schemas.microsoft.com/office/drawing/2010/main" val="0"/>
+              </a:ext>
+            </a:extLst>
+          </a:blip>
+          <a:stretch>
+            <a:fillRect/>
+          </a:stretch>
+        </p:blipFill>
+        <p:spPr>
+          <a:xfrm>
+            <a:off x="1021080" y="3338891"/>
+            <a:ext cx="10236200" cy="2605577"/>
+          </a:xfrm>
+          <a:prstGeom prst="rect">
+            <a:avLst/>
+          </a:prstGeom>
+        </p:spPr>
+      </p:pic>
     </p:spTree>
     <p:extLst>
       <p:ext uri="{BB962C8B-B14F-4D97-AF65-F5344CB8AC3E}">
@@ -11353,8 +11465,53 @@
           <a:p>
             <a:r>
               <a:rPr lang="en-GB" dirty="0"/>
+              <a:t>Limitations </a:t>
+            </a:r>
+            <a:r>
+              <a:rPr lang="nl-BE" dirty="0" err="1"/>
+              <a:t>due</a:t>
+            </a:r>
+            <a:r>
+              <a:rPr lang="nl-BE" dirty="0"/>
+              <a:t> </a:t>
+            </a:r>
+            <a:r>
+              <a:rPr lang="nl-BE" dirty="0" err="1"/>
+              <a:t>to</a:t>
+            </a:r>
+            <a:r>
+              <a:rPr lang="nl-BE" dirty="0"/>
+              <a:t> corona </a:t>
+            </a:r>
+            <a:r>
+              <a:rPr lang="nl-BE" dirty="0" err="1"/>
+              <a:t>measures</a:t>
+            </a:r>
+            <a:r>
+              <a:rPr lang="nl-BE" dirty="0"/>
+              <a:t> </a:t>
+            </a:r>
+            <a:endParaRPr lang="en-GB" dirty="0"/>
+          </a:p>
+          <a:p>
+            <a:pPr lvl="1"/>
+            <a:r>
+              <a:rPr lang="en-GB" dirty="0"/>
               <a:t>Correct cooperation of sensor board with the main board.</a:t>
             </a:r>
+          </a:p>
+          <a:p>
+            <a:pPr lvl="1"/>
+            <a:r>
+              <a:rPr lang="en-GB" dirty="0"/>
+              <a:t>Power measurements =&gt; break out boards send to Thomas for functionality tests</a:t>
+            </a:r>
+          </a:p>
+          <a:p>
+            <a:pPr lvl="1"/>
+            <a:endParaRPr lang="en-GB" dirty="0"/>
+          </a:p>
+          <a:p>
             <a:endParaRPr lang="nl-BE" dirty="0"/>
           </a:p>
         </p:txBody>

</xml_diff>